<commit_message>
github features draft finished(tm), minor image update
</commit_message>
<xml_diff>
--- a/slides/branching_merging.pptx
+++ b/slides/branching_merging.pptx
@@ -3676,7 +3676,7 @@
           <a:lstStyle/>
           <a:p>
             <a:r>
-              <a:rPr lang="en-GB" dirty="0" smtClean="0">
+              <a:rPr lang="en-GB" sz="2800" dirty="0" smtClean="0">
                 <a:solidFill>
                   <a:schemeClr val="accent6">
                     <a:lumMod val="50000"/>
@@ -3699,7 +3699,7 @@
           </a:p>
           <a:p>
             <a:r>
-              <a:rPr lang="en-GB" dirty="0">
+              <a:rPr lang="en-GB" sz="2800" dirty="0">
                 <a:solidFill>
                   <a:schemeClr val="accent6">
                     <a:lumMod val="50000"/>
@@ -3710,7 +3710,7 @@
               <a:t>git branch </a:t>
             </a:r>
             <a:r>
-              <a:rPr lang="en-GB" dirty="0" smtClean="0">
+              <a:rPr lang="en-GB" sz="2800" dirty="0" smtClean="0">
                 <a:solidFill>
                   <a:schemeClr val="accent6">
                     <a:lumMod val="50000"/>
@@ -3720,7 +3720,7 @@
               </a:rPr>
               <a:t>&lt;branch&gt;</a:t>
             </a:r>
-            <a:endParaRPr lang="en-GB" dirty="0">
+            <a:endParaRPr lang="en-GB" sz="2800" dirty="0">
               <a:solidFill>
                 <a:schemeClr val="accent6">
                   <a:lumMod val="50000"/>
@@ -3741,7 +3741,7 @@
           </a:p>
           <a:p>
             <a:r>
-              <a:rPr lang="en-GB" dirty="0">
+              <a:rPr lang="en-GB" sz="2800" dirty="0">
                 <a:solidFill>
                   <a:schemeClr val="accent6">
                     <a:lumMod val="50000"/>
@@ -3763,7 +3763,7 @@
           </a:p>
           <a:p>
             <a:r>
-              <a:rPr lang="en-GB" dirty="0">
+              <a:rPr lang="en-GB" sz="2800" dirty="0">
                 <a:solidFill>
                   <a:schemeClr val="accent6">
                     <a:lumMod val="50000"/>
@@ -3793,17 +3793,14 @@
         </p:nvSpPr>
         <p:spPr>
           <a:xfrm>
-            <a:off x="5652120" y="1765502"/>
-            <a:ext cx="3168000" cy="1323439"/>
+            <a:off x="5148064" y="1765502"/>
+            <a:ext cx="3672056" cy="1169551"/>
           </a:xfrm>
           <a:prstGeom prst="rect">
             <a:avLst/>
           </a:prstGeom>
           <a:solidFill>
-            <a:schemeClr val="tx2">
-              <a:lumMod val="20000"/>
-              <a:lumOff val="80000"/>
-            </a:schemeClr>
+            <a:schemeClr val="tx1"/>
           </a:solidFill>
         </p:spPr>
         <p:txBody>
@@ -3812,120 +3809,92 @@
           </a:bodyPr>
           <a:lstStyle/>
           <a:p>
-            <a:pPr>
-              <a:spcBef>
-                <a:spcPts val="300"/>
-              </a:spcBef>
-              <a:spcAft>
-                <a:spcPts val="300"/>
-              </a:spcAft>
-            </a:pPr>
-            <a:r>
-              <a:rPr lang="en-GB" sz="1200" dirty="0" smtClean="0">
+            <a:r>
+              <a:rPr lang="en-GB" sz="1400" dirty="0">
                 <a:solidFill>
                   <a:schemeClr val="accent6">
-                    <a:lumMod val="50000"/>
+                    <a:lumMod val="75000"/>
                   </a:schemeClr>
                 </a:solidFill>
                 <a:latin typeface="Envy Code R" panose="02000509000000020004" pitchFamily="49" charset="0"/>
-                <a:cs typeface="Consolas" panose="020B0609020204030204" pitchFamily="49" charset="0"/>
               </a:rPr>
               <a:t>$ git branch</a:t>
             </a:r>
-            <a:endParaRPr lang="en-GB" sz="1200" dirty="0">
+            <a:endParaRPr lang="en-GB" sz="1400" dirty="0">
               <a:solidFill>
                 <a:schemeClr val="accent6">
-                  <a:lumMod val="50000"/>
+                  <a:lumMod val="75000"/>
                 </a:schemeClr>
               </a:solidFill>
               <a:latin typeface="Envy Code R" panose="02000509000000020004" pitchFamily="49" charset="0"/>
-              <a:cs typeface="Consolas" panose="020B0609020204030204" pitchFamily="49" charset="0"/>
             </a:endParaRPr>
           </a:p>
           <a:p>
-            <a:pPr>
-              <a:spcBef>
-                <a:spcPts val="300"/>
-              </a:spcBef>
-              <a:spcAft>
-                <a:spcPts val="300"/>
-              </a:spcAft>
-            </a:pPr>
-            <a:r>
-              <a:rPr lang="en-GB" sz="1200" dirty="0" smtClean="0">
+            <a:r>
+              <a:rPr lang="en-GB" sz="1400" dirty="0">
+                <a:solidFill>
+                  <a:schemeClr val="bg1"/>
+                </a:solidFill>
                 <a:latin typeface="Envy Code R" panose="02000509000000020004" pitchFamily="49" charset="0"/>
-                <a:cs typeface="Consolas" panose="020B0609020204030204" pitchFamily="49" charset="0"/>
               </a:rPr>
               <a:t>* crazy   3b74ddf best feature ever?</a:t>
             </a:r>
           </a:p>
           <a:p>
-            <a:pPr>
-              <a:spcBef>
-                <a:spcPts val="300"/>
-              </a:spcBef>
-              <a:spcAft>
-                <a:spcPts val="300"/>
-              </a:spcAft>
-            </a:pPr>
-            <a:r>
-              <a:rPr lang="en-GB" sz="1200" dirty="0">
+            <a:r>
+              <a:rPr lang="en-GB" sz="1400" dirty="0">
+                <a:solidFill>
+                  <a:schemeClr val="bg1"/>
+                </a:solidFill>
                 <a:latin typeface="Envy Code R" panose="02000509000000020004" pitchFamily="49" charset="0"/>
-                <a:cs typeface="Consolas" panose="020B0609020204030204" pitchFamily="49" charset="0"/>
               </a:rPr>
               <a:t> </a:t>
             </a:r>
             <a:r>
-              <a:rPr lang="en-GB" sz="1200" dirty="0" smtClean="0">
+              <a:rPr lang="en-GB" sz="1400" dirty="0">
+                <a:solidFill>
+                  <a:schemeClr val="bg1"/>
+                </a:solidFill>
                 <a:latin typeface="Envy Code R" panose="02000509000000020004" pitchFamily="49" charset="0"/>
-                <a:cs typeface="Consolas" panose="020B0609020204030204" pitchFamily="49" charset="0"/>
               </a:rPr>
               <a:t> master  90cd414 added GUI</a:t>
             </a:r>
           </a:p>
           <a:p>
-            <a:pPr>
-              <a:spcBef>
-                <a:spcPts val="300"/>
-              </a:spcBef>
-              <a:spcAft>
-                <a:spcPts val="300"/>
-              </a:spcAft>
-            </a:pPr>
-            <a:r>
-              <a:rPr lang="en-GB" sz="1200" dirty="0" smtClean="0">
+            <a:r>
+              <a:rPr lang="en-GB" sz="1400" dirty="0">
+                <a:solidFill>
+                  <a:schemeClr val="bg1"/>
+                </a:solidFill>
                 <a:latin typeface="Envy Code R" panose="02000509000000020004" pitchFamily="49" charset="0"/>
-                <a:cs typeface="Consolas" panose="020B0609020204030204" pitchFamily="49" charset="0"/>
               </a:rPr>
               <a:t>  stable  3b74ddf feature A included</a:t>
             </a:r>
           </a:p>
           <a:p>
-            <a:pPr>
-              <a:spcBef>
-                <a:spcPts val="300"/>
-              </a:spcBef>
-              <a:spcAft>
-                <a:spcPts val="300"/>
-              </a:spcAft>
-            </a:pPr>
-            <a:r>
-              <a:rPr lang="en-GB" sz="1200" dirty="0">
+            <a:r>
+              <a:rPr lang="en-GB" sz="1400" dirty="0">
+                <a:solidFill>
+                  <a:schemeClr val="bg1"/>
+                </a:solidFill>
                 <a:latin typeface="Envy Code R" panose="02000509000000020004" pitchFamily="49" charset="0"/>
-                <a:cs typeface="Consolas" panose="020B0609020204030204" pitchFamily="49" charset="0"/>
               </a:rPr>
               <a:t> </a:t>
             </a:r>
             <a:r>
-              <a:rPr lang="en-GB" sz="1200" dirty="0" smtClean="0">
+              <a:rPr lang="en-GB" sz="1400" dirty="0">
+                <a:solidFill>
+                  <a:schemeClr val="bg1"/>
+                </a:solidFill>
                 <a:latin typeface="Envy Code R" panose="02000509000000020004" pitchFamily="49" charset="0"/>
-                <a:cs typeface="Consolas" panose="020B0609020204030204" pitchFamily="49" charset="0"/>
               </a:rPr>
               <a:t> test    62a557a updated test code</a:t>
             </a:r>
-            <a:endParaRPr lang="en-GB" sz="1200" dirty="0">
+            <a:endParaRPr lang="en-GB" sz="1400" dirty="0">
+              <a:solidFill>
+                <a:schemeClr val="bg1"/>
+              </a:solidFill>
               <a:latin typeface="Envy Code R" panose="02000509000000020004" pitchFamily="49" charset="0"/>
-              <a:cs typeface="Consolas" panose="020B0609020204030204" pitchFamily="49" charset="0"/>
             </a:endParaRPr>
           </a:p>
         </p:txBody>
@@ -3938,17 +3907,14 @@
         </p:nvSpPr>
         <p:spPr>
           <a:xfrm>
-            <a:off x="5652120" y="3951347"/>
-            <a:ext cx="3168000" cy="1061829"/>
+            <a:off x="5148064" y="3789040"/>
+            <a:ext cx="3672056" cy="954107"/>
           </a:xfrm>
           <a:prstGeom prst="rect">
             <a:avLst/>
           </a:prstGeom>
           <a:solidFill>
-            <a:schemeClr val="tx2">
-              <a:lumMod val="20000"/>
-              <a:lumOff val="80000"/>
-            </a:schemeClr>
+            <a:schemeClr val="tx1"/>
           </a:solidFill>
         </p:spPr>
         <p:txBody>
@@ -3957,109 +3923,79 @@
           </a:bodyPr>
           <a:lstStyle/>
           <a:p>
-            <a:pPr>
-              <a:spcBef>
-                <a:spcPts val="300"/>
-              </a:spcBef>
-              <a:spcAft>
-                <a:spcPts val="300"/>
-              </a:spcAft>
-            </a:pPr>
-            <a:r>
-              <a:rPr lang="en-GB" sz="1200" dirty="0" smtClean="0">
+            <a:r>
+              <a:rPr lang="en-GB" sz="1400" dirty="0">
                 <a:solidFill>
                   <a:schemeClr val="accent6">
-                    <a:lumMod val="50000"/>
+                    <a:lumMod val="75000"/>
                   </a:schemeClr>
                 </a:solidFill>
                 <a:latin typeface="Envy Code R" panose="02000509000000020004" pitchFamily="49" charset="0"/>
-                <a:cs typeface="Consolas" panose="020B0609020204030204" pitchFamily="49" charset="0"/>
               </a:rPr>
               <a:t>$ </a:t>
             </a:r>
             <a:r>
-              <a:rPr lang="en-GB" sz="1200" dirty="0">
+              <a:rPr lang="en-GB" sz="1400" dirty="0">
                 <a:solidFill>
                   <a:schemeClr val="accent6">
-                    <a:lumMod val="50000"/>
+                    <a:lumMod val="75000"/>
                   </a:schemeClr>
                 </a:solidFill>
                 <a:latin typeface="Envy Code R" panose="02000509000000020004" pitchFamily="49" charset="0"/>
-                <a:cs typeface="Consolas" panose="020B0609020204030204" pitchFamily="49" charset="0"/>
               </a:rPr>
               <a:t>git checkout master</a:t>
             </a:r>
           </a:p>
           <a:p>
-            <a:pPr>
-              <a:spcBef>
-                <a:spcPts val="300"/>
-              </a:spcBef>
-              <a:spcAft>
-                <a:spcPts val="300"/>
-              </a:spcAft>
-            </a:pPr>
-            <a:r>
-              <a:rPr lang="en-GB" sz="1200" dirty="0" smtClean="0">
+            <a:r>
+              <a:rPr lang="en-GB" sz="1400" dirty="0">
+                <a:solidFill>
+                  <a:schemeClr val="bg1"/>
+                </a:solidFill>
                 <a:latin typeface="Envy Code R" panose="02000509000000020004" pitchFamily="49" charset="0"/>
-                <a:cs typeface="Consolas" panose="020B0609020204030204" pitchFamily="49" charset="0"/>
               </a:rPr>
               <a:t>Switched to branch 'master'</a:t>
             </a:r>
           </a:p>
           <a:p>
-            <a:pPr>
-              <a:spcBef>
-                <a:spcPts val="300"/>
-              </a:spcBef>
-              <a:spcAft>
-                <a:spcPts val="300"/>
-              </a:spcAft>
-            </a:pPr>
-            <a:r>
-              <a:rPr lang="en-GB" sz="1200" dirty="0" smtClean="0">
+            <a:r>
+              <a:rPr lang="en-GB" sz="1400" dirty="0">
                 <a:solidFill>
                   <a:schemeClr val="accent6">
-                    <a:lumMod val="50000"/>
+                    <a:lumMod val="75000"/>
                   </a:schemeClr>
                 </a:solidFill>
                 <a:latin typeface="Envy Code R" panose="02000509000000020004" pitchFamily="49" charset="0"/>
-                <a:cs typeface="Consolas" panose="020B0609020204030204" pitchFamily="49" charset="0"/>
               </a:rPr>
               <a:t>$ </a:t>
             </a:r>
             <a:r>
-              <a:rPr lang="en-GB" sz="1200" dirty="0">
+              <a:rPr lang="en-GB" sz="1400" dirty="0">
                 <a:solidFill>
                   <a:schemeClr val="accent6">
-                    <a:lumMod val="50000"/>
+                    <a:lumMod val="75000"/>
                   </a:schemeClr>
                 </a:solidFill>
                 <a:latin typeface="Envy Code R" panose="02000509000000020004" pitchFamily="49" charset="0"/>
-                <a:cs typeface="Consolas" panose="020B0609020204030204" pitchFamily="49" charset="0"/>
               </a:rPr>
               <a:t>git branch -d crazy</a:t>
             </a:r>
           </a:p>
           <a:p>
-            <a:pPr>
-              <a:spcBef>
-                <a:spcPts val="300"/>
-              </a:spcBef>
-              <a:spcAft>
-                <a:spcPts val="300"/>
-              </a:spcAft>
-            </a:pPr>
-            <a:r>
-              <a:rPr lang="en-GB" sz="1200" dirty="0" smtClean="0">
+            <a:r>
+              <a:rPr lang="en-GB" sz="1400" dirty="0">
+                <a:solidFill>
+                  <a:schemeClr val="bg1"/>
+                </a:solidFill>
                 <a:latin typeface="Envy Code R" panose="02000509000000020004" pitchFamily="49" charset="0"/>
-                <a:cs typeface="Consolas" panose="020B0609020204030204" pitchFamily="49" charset="0"/>
               </a:rPr>
               <a:t>Deleted branch crazy (was 3b74ddf).</a:t>
             </a:r>
-            <a:endParaRPr lang="en-GB" sz="1200" dirty="0">
+            <a:endParaRPr lang="en-GB" sz="1400" dirty="0">
+              <a:solidFill>
+                <a:schemeClr val="bg1"/>
+              </a:solidFill>
               <a:latin typeface="Envy Code R" panose="02000509000000020004" pitchFamily="49" charset="0"/>
-              <a:cs typeface="Consolas" panose="020B0609020204030204" pitchFamily="49" charset="0"/>
             </a:endParaRPr>
           </a:p>
         </p:txBody>
@@ -4715,15 +4651,7 @@
             </a:pPr>
             <a:r>
               <a:rPr lang="en-GB" sz="3200" dirty="0" smtClean="0"/>
-              <a:t>The branches have diverged, i</a:t>
-            </a:r>
-            <a:r>
-              <a:rPr lang="en-GB" sz="3200" dirty="0" smtClean="0"/>
-              <a:t>.e.,</a:t>
-            </a:r>
-            <a:r>
-              <a:rPr lang="en-GB" sz="3200" dirty="0" smtClean="0"/>
-              <a:t> no linear path to the target branch.</a:t>
+              <a:t>The branches have diverged, i.e., no linear path to the target branch.</a:t>
             </a:r>
           </a:p>
           <a:p>
@@ -4735,7 +4663,6 @@
               <a:rPr lang="en-GB" sz="3200" dirty="0"/>
               <a:t>3-way merges use a dedicated commit to tie together the two histories.</a:t>
             </a:r>
-            <a:endParaRPr lang="en-GB" sz="3200" dirty="0"/>
           </a:p>
         </p:txBody>
       </p:sp>
@@ -5117,17 +5044,14 @@
         </p:nvSpPr>
         <p:spPr>
           <a:xfrm>
-            <a:off x="395536" y="2276872"/>
-            <a:ext cx="4068000" cy="1323439"/>
+            <a:off x="431536" y="2460958"/>
+            <a:ext cx="3996000" cy="1169551"/>
           </a:xfrm>
           <a:prstGeom prst="rect">
             <a:avLst/>
           </a:prstGeom>
           <a:solidFill>
-            <a:schemeClr val="tx2">
-              <a:lumMod val="20000"/>
-              <a:lumOff val="80000"/>
-            </a:schemeClr>
+            <a:schemeClr val="tx1"/>
           </a:solidFill>
         </p:spPr>
         <p:txBody>
@@ -5136,124 +5060,115 @@
           </a:bodyPr>
           <a:lstStyle/>
           <a:p>
-            <a:pPr>
-              <a:spcBef>
-                <a:spcPts val="300"/>
-              </a:spcBef>
-              <a:spcAft>
-                <a:spcPts val="300"/>
-              </a:spcAft>
-            </a:pPr>
-            <a:r>
-              <a:rPr lang="en-GB" sz="1200" dirty="0">
+            <a:r>
+              <a:rPr lang="en-GB" sz="1400" dirty="0">
+                <a:solidFill>
+                  <a:schemeClr val="bg1"/>
+                </a:solidFill>
                 <a:latin typeface="Envy Code R" panose="02000509000000020004" pitchFamily="49" charset="0"/>
-                <a:cs typeface="Consolas" panose="020B0609020204030204" pitchFamily="49" charset="0"/>
               </a:rPr>
               <a:t>This </a:t>
             </a:r>
             <a:r>
-              <a:rPr lang="en-GB" sz="1200" dirty="0" smtClean="0">
+              <a:rPr lang="en-GB" sz="1400" dirty="0">
+                <a:solidFill>
+                  <a:schemeClr val="bg1"/>
+                </a:solidFill>
                 <a:latin typeface="Envy Code R" panose="02000509000000020004" pitchFamily="49" charset="0"/>
-                <a:cs typeface="Consolas" panose="020B0609020204030204" pitchFamily="49" charset="0"/>
               </a:rPr>
               <a:t>is</a:t>
             </a:r>
           </a:p>
           <a:p>
-            <a:pPr>
-              <a:spcBef>
-                <a:spcPts val="300"/>
-              </a:spcBef>
-              <a:spcAft>
-                <a:spcPts val="300"/>
-              </a:spcAft>
-            </a:pPr>
-            <a:r>
-              <a:rPr lang="en-GB" sz="1200" dirty="0" smtClean="0">
+            <a:r>
+              <a:rPr lang="en-GB" sz="1400" dirty="0">
+                <a:solidFill>
+                  <a:schemeClr val="bg1"/>
+                </a:solidFill>
                 <a:latin typeface="Envy Code R" panose="02000509000000020004" pitchFamily="49" charset="0"/>
-                <a:cs typeface="Consolas" panose="020B0609020204030204" pitchFamily="49" charset="0"/>
               </a:rPr>
               <a:t>the </a:t>
             </a:r>
             <a:r>
-              <a:rPr lang="en-GB" sz="1200" dirty="0">
+              <a:rPr lang="en-GB" sz="1400" dirty="0">
+                <a:solidFill>
+                  <a:schemeClr val="bg1"/>
+                </a:solidFill>
                 <a:latin typeface="Envy Code R" panose="02000509000000020004" pitchFamily="49" charset="0"/>
-                <a:cs typeface="Consolas" panose="020B0609020204030204" pitchFamily="49" charset="0"/>
               </a:rPr>
               <a:t>new file</a:t>
             </a:r>
           </a:p>
           <a:p>
-            <a:pPr>
-              <a:spcBef>
-                <a:spcPts val="300"/>
-              </a:spcBef>
-              <a:spcAft>
-                <a:spcPts val="300"/>
-              </a:spcAft>
-            </a:pPr>
-            <a:r>
-              <a:rPr lang="en-GB" sz="1200" dirty="0">
+            <a:r>
+              <a:rPr lang="en-GB" sz="1400" dirty="0">
+                <a:solidFill>
+                  <a:schemeClr val="bg1"/>
+                </a:solidFill>
                 <a:latin typeface="Envy Code R" panose="02000509000000020004" pitchFamily="49" charset="0"/>
-                <a:cs typeface="Consolas" panose="020B0609020204030204" pitchFamily="49" charset="0"/>
               </a:rPr>
               <a:t>content that is</a:t>
             </a:r>
           </a:p>
           <a:p>
-            <a:pPr>
-              <a:spcBef>
-                <a:spcPts val="300"/>
-              </a:spcBef>
-              <a:spcAft>
-                <a:spcPts val="300"/>
-              </a:spcAft>
-            </a:pPr>
-            <a:r>
-              <a:rPr lang="en-GB" sz="1200" dirty="0">
+            <a:r>
+              <a:rPr lang="en-GB" sz="1400" dirty="0">
+                <a:solidFill>
+                  <a:schemeClr val="bg1"/>
+                </a:solidFill>
                 <a:latin typeface="Envy Code R" panose="02000509000000020004" pitchFamily="49" charset="0"/>
-                <a:cs typeface="Consolas" panose="020B0609020204030204" pitchFamily="49" charset="0"/>
               </a:rPr>
               <a:t>in the </a:t>
             </a:r>
             <a:r>
-              <a:rPr lang="en-GB" sz="1200" dirty="0" smtClean="0">
+              <a:rPr lang="en-GB" sz="1400" dirty="0">
+                <a:solidFill>
+                  <a:schemeClr val="bg1"/>
+                </a:solidFill>
                 <a:latin typeface="Envy Code R" panose="02000509000000020004" pitchFamily="49" charset="0"/>
-                <a:cs typeface="Consolas" panose="020B0609020204030204" pitchFamily="49" charset="0"/>
               </a:rPr>
               <a:t>file,</a:t>
             </a:r>
-            <a:endParaRPr lang="en-GB" sz="1200" dirty="0">
+            <a:endParaRPr lang="en-GB" sz="1400" dirty="0">
+              <a:solidFill>
+                <a:schemeClr val="bg1"/>
+              </a:solidFill>
               <a:latin typeface="Envy Code R" panose="02000509000000020004" pitchFamily="49" charset="0"/>
-              <a:cs typeface="Consolas" panose="020B0609020204030204" pitchFamily="49" charset="0"/>
             </a:endParaRPr>
           </a:p>
           <a:p>
-            <a:pPr>
-              <a:spcBef>
-                <a:spcPts val="300"/>
-              </a:spcBef>
-              <a:spcAft>
-                <a:spcPts val="300"/>
-              </a:spcAft>
-            </a:pPr>
-            <a:r>
-              <a:rPr lang="en-GB" sz="1200" dirty="0">
+            <a:r>
+              <a:rPr lang="en-GB" sz="1400" dirty="0">
+                <a:solidFill>
+                  <a:schemeClr val="bg1"/>
+                </a:solidFill>
                 <a:latin typeface="Envy Code R" panose="02000509000000020004" pitchFamily="49" charset="0"/>
-                <a:cs typeface="Consolas" panose="020B0609020204030204" pitchFamily="49" charset="0"/>
               </a:rPr>
-              <a:t>refined as part of the update to branch master</a:t>
-            </a:r>
-            <a:r>
-              <a:rPr lang="en-GB" sz="1200" dirty="0" smtClean="0">
+              <a:t>refined as part of the update to </a:t>
+            </a:r>
+            <a:r>
+              <a:rPr lang="en-GB" sz="1400" dirty="0" smtClean="0">
+                <a:solidFill>
+                  <a:schemeClr val="bg1"/>
+                </a:solidFill>
                 <a:latin typeface="Envy Code R" panose="02000509000000020004" pitchFamily="49" charset="0"/>
-                <a:cs typeface="Consolas" panose="020B0609020204030204" pitchFamily="49" charset="0"/>
+              </a:rPr>
+              <a:t>master</a:t>
+            </a:r>
+            <a:r>
+              <a:rPr lang="en-GB" sz="1400" dirty="0">
+                <a:solidFill>
+                  <a:schemeClr val="bg1"/>
+                </a:solidFill>
+                <a:latin typeface="Envy Code R" panose="02000509000000020004" pitchFamily="49" charset="0"/>
               </a:rPr>
               <a:t>.</a:t>
             </a:r>
-            <a:endParaRPr lang="en-GB" sz="1200" dirty="0">
+            <a:endParaRPr lang="en-GB" sz="1400" dirty="0">
+              <a:solidFill>
+                <a:schemeClr val="bg1"/>
+              </a:solidFill>
               <a:latin typeface="Envy Code R" panose="02000509000000020004" pitchFamily="49" charset="0"/>
-              <a:cs typeface="Consolas" panose="020B0609020204030204" pitchFamily="49" charset="0"/>
             </a:endParaRPr>
           </a:p>
         </p:txBody>
@@ -5266,17 +5181,14 @@
         </p:nvSpPr>
         <p:spPr>
           <a:xfrm>
-            <a:off x="4716016" y="2276872"/>
-            <a:ext cx="4068000" cy="2893100"/>
+            <a:off x="4651216" y="2460958"/>
+            <a:ext cx="3996000" cy="2462213"/>
           </a:xfrm>
           <a:prstGeom prst="rect">
             <a:avLst/>
           </a:prstGeom>
           <a:solidFill>
-            <a:schemeClr val="tx2">
-              <a:lumMod val="20000"/>
-              <a:lumOff val="80000"/>
-            </a:schemeClr>
+            <a:schemeClr val="tx1"/>
           </a:solidFill>
         </p:spPr>
         <p:txBody>
@@ -5285,210 +5197,176 @@
           </a:bodyPr>
           <a:lstStyle/>
           <a:p>
-            <a:pPr>
-              <a:spcBef>
-                <a:spcPts val="300"/>
-              </a:spcBef>
-              <a:spcAft>
-                <a:spcPts val="300"/>
-              </a:spcAft>
-            </a:pPr>
-            <a:r>
-              <a:rPr lang="en-GB" sz="1200" dirty="0">
+            <a:r>
+              <a:rPr lang="en-GB" sz="1400" dirty="0">
+                <a:solidFill>
+                  <a:schemeClr val="bg1"/>
+                </a:solidFill>
                 <a:latin typeface="Envy Code R" panose="02000509000000020004" pitchFamily="49" charset="0"/>
-                <a:cs typeface="Consolas" panose="020B0609020204030204" pitchFamily="49" charset="0"/>
               </a:rPr>
               <a:t>This is</a:t>
             </a:r>
           </a:p>
           <a:p>
-            <a:pPr>
-              <a:spcBef>
-                <a:spcPts val="300"/>
-              </a:spcBef>
-              <a:spcAft>
-                <a:spcPts val="300"/>
-              </a:spcAft>
-            </a:pPr>
-            <a:r>
-              <a:rPr lang="en-GB" sz="1200" dirty="0">
+            <a:r>
+              <a:rPr lang="en-GB" sz="1400" dirty="0">
+                <a:solidFill>
+                  <a:schemeClr val="accent6">
+                    <a:lumMod val="75000"/>
+                  </a:schemeClr>
+                </a:solidFill>
                 <a:latin typeface="Envy Code R" panose="02000509000000020004" pitchFamily="49" charset="0"/>
-                <a:cs typeface="Consolas" panose="020B0609020204030204" pitchFamily="49" charset="0"/>
               </a:rPr>
               <a:t>&lt;&lt;&lt;&lt;&lt;&lt;&lt; HEAD</a:t>
             </a:r>
           </a:p>
           <a:p>
-            <a:pPr>
-              <a:spcBef>
-                <a:spcPts val="300"/>
-              </a:spcBef>
-              <a:spcAft>
-                <a:spcPts val="300"/>
-              </a:spcAft>
-            </a:pPr>
-            <a:r>
-              <a:rPr lang="en-GB" sz="1200" dirty="0">
+            <a:r>
+              <a:rPr lang="en-GB" sz="1400" dirty="0">
+                <a:solidFill>
+                  <a:schemeClr val="bg1"/>
+                </a:solidFill>
                 <a:latin typeface="Envy Code R" panose="02000509000000020004" pitchFamily="49" charset="0"/>
-                <a:cs typeface="Consolas" panose="020B0609020204030204" pitchFamily="49" charset="0"/>
               </a:rPr>
               <a:t>the new file</a:t>
             </a:r>
           </a:p>
           <a:p>
-            <a:pPr>
-              <a:spcBef>
-                <a:spcPts val="300"/>
-              </a:spcBef>
-              <a:spcAft>
-                <a:spcPts val="300"/>
-              </a:spcAft>
-            </a:pPr>
-            <a:r>
-              <a:rPr lang="en-GB" sz="1200" dirty="0">
+            <a:r>
+              <a:rPr lang="en-GB" sz="1400" dirty="0">
+                <a:solidFill>
+                  <a:schemeClr val="bg1"/>
+                </a:solidFill>
                 <a:latin typeface="Envy Code R" panose="02000509000000020004" pitchFamily="49" charset="0"/>
-                <a:cs typeface="Consolas" panose="020B0609020204030204" pitchFamily="49" charset="0"/>
               </a:rPr>
               <a:t>content that is</a:t>
             </a:r>
           </a:p>
           <a:p>
-            <a:pPr>
-              <a:spcBef>
-                <a:spcPts val="300"/>
-              </a:spcBef>
-              <a:spcAft>
-                <a:spcPts val="300"/>
-              </a:spcAft>
-            </a:pPr>
-            <a:r>
-              <a:rPr lang="en-GB" sz="1200" dirty="0">
+            <a:r>
+              <a:rPr lang="en-GB" sz="1400" dirty="0">
+                <a:solidFill>
+                  <a:schemeClr val="bg1"/>
+                </a:solidFill>
                 <a:latin typeface="Envy Code R" panose="02000509000000020004" pitchFamily="49" charset="0"/>
-                <a:cs typeface="Consolas" panose="020B0609020204030204" pitchFamily="49" charset="0"/>
               </a:rPr>
               <a:t>in the </a:t>
             </a:r>
             <a:r>
-              <a:rPr lang="en-GB" sz="1200" dirty="0" smtClean="0">
+              <a:rPr lang="en-GB" sz="1400" dirty="0">
+                <a:solidFill>
+                  <a:schemeClr val="bg1"/>
+                </a:solidFill>
                 <a:latin typeface="Envy Code R" panose="02000509000000020004" pitchFamily="49" charset="0"/>
-                <a:cs typeface="Consolas" panose="020B0609020204030204" pitchFamily="49" charset="0"/>
               </a:rPr>
               <a:t>file,</a:t>
             </a:r>
-            <a:endParaRPr lang="en-GB" sz="1200" dirty="0">
+            <a:endParaRPr lang="en-GB" sz="1400" dirty="0">
+              <a:solidFill>
+                <a:schemeClr val="bg1"/>
+              </a:solidFill>
               <a:latin typeface="Envy Code R" panose="02000509000000020004" pitchFamily="49" charset="0"/>
-              <a:cs typeface="Consolas" panose="020B0609020204030204" pitchFamily="49" charset="0"/>
             </a:endParaRPr>
           </a:p>
           <a:p>
-            <a:pPr>
-              <a:spcBef>
-                <a:spcPts val="300"/>
-              </a:spcBef>
-              <a:spcAft>
-                <a:spcPts val="300"/>
-              </a:spcAft>
-            </a:pPr>
-            <a:r>
-              <a:rPr lang="en-GB" sz="1200" dirty="0">
+            <a:r>
+              <a:rPr lang="en-GB" sz="1400" dirty="0">
+                <a:solidFill>
+                  <a:schemeClr val="bg1"/>
+                </a:solidFill>
                 <a:latin typeface="Envy Code R" panose="02000509000000020004" pitchFamily="49" charset="0"/>
-                <a:cs typeface="Consolas" panose="020B0609020204030204" pitchFamily="49" charset="0"/>
               </a:rPr>
-              <a:t>refined as part of the update to branch master.</a:t>
-            </a:r>
-          </a:p>
-          <a:p>
-            <a:pPr>
-              <a:spcBef>
-                <a:spcPts val="300"/>
-              </a:spcBef>
-              <a:spcAft>
-                <a:spcPts val="300"/>
-              </a:spcAft>
-            </a:pPr>
-            <a:r>
-              <a:rPr lang="en-GB" sz="1200" dirty="0">
+              <a:t>refined as part of the update to </a:t>
+            </a:r>
+            <a:r>
+              <a:rPr lang="en-GB" sz="1400" dirty="0" smtClean="0">
+                <a:solidFill>
+                  <a:schemeClr val="bg1"/>
+                </a:solidFill>
                 <a:latin typeface="Envy Code R" panose="02000509000000020004" pitchFamily="49" charset="0"/>
-                <a:cs typeface="Consolas" panose="020B0609020204030204" pitchFamily="49" charset="0"/>
+              </a:rPr>
+              <a:t>master</a:t>
+            </a:r>
+            <a:r>
+              <a:rPr lang="en-GB" sz="1400" dirty="0">
+                <a:solidFill>
+                  <a:schemeClr val="bg1"/>
+                </a:solidFill>
+                <a:latin typeface="Envy Code R" panose="02000509000000020004" pitchFamily="49" charset="0"/>
+              </a:rPr>
+              <a:t>.</a:t>
+            </a:r>
+          </a:p>
+          <a:p>
+            <a:r>
+              <a:rPr lang="en-GB" sz="1400" dirty="0">
+                <a:solidFill>
+                  <a:schemeClr val="accent6">
+                    <a:lumMod val="75000"/>
+                  </a:schemeClr>
+                </a:solidFill>
+                <a:latin typeface="Envy Code R" panose="02000509000000020004" pitchFamily="49" charset="0"/>
               </a:rPr>
               <a:t>=======</a:t>
             </a:r>
           </a:p>
           <a:p>
-            <a:pPr>
-              <a:spcBef>
-                <a:spcPts val="300"/>
-              </a:spcBef>
-              <a:spcAft>
-                <a:spcPts val="300"/>
-              </a:spcAft>
-            </a:pPr>
-            <a:r>
-              <a:rPr lang="en-GB" sz="1200" dirty="0">
+            <a:r>
+              <a:rPr lang="en-GB" sz="1400" dirty="0">
+                <a:solidFill>
+                  <a:schemeClr val="bg1"/>
+                </a:solidFill>
                 <a:latin typeface="Envy Code R" panose="02000509000000020004" pitchFamily="49" charset="0"/>
-                <a:cs typeface="Consolas" panose="020B0609020204030204" pitchFamily="49" charset="0"/>
               </a:rPr>
               <a:t>the</a:t>
             </a:r>
           </a:p>
           <a:p>
-            <a:pPr>
-              <a:spcBef>
-                <a:spcPts val="300"/>
-              </a:spcBef>
-              <a:spcAft>
-                <a:spcPts val="300"/>
-              </a:spcAft>
-            </a:pPr>
-            <a:r>
-              <a:rPr lang="en-GB" sz="1200" dirty="0">
+            <a:r>
+              <a:rPr lang="en-GB" sz="1400" dirty="0">
+                <a:solidFill>
+                  <a:schemeClr val="bg1"/>
+                </a:solidFill>
                 <a:latin typeface="Envy Code R" panose="02000509000000020004" pitchFamily="49" charset="0"/>
-                <a:cs typeface="Consolas" panose="020B0609020204030204" pitchFamily="49" charset="0"/>
               </a:rPr>
               <a:t>content </a:t>
             </a:r>
             <a:r>
-              <a:rPr lang="en-GB" sz="1200" dirty="0" smtClean="0">
+              <a:rPr lang="en-GB" sz="1400" dirty="0">
+                <a:solidFill>
+                  <a:schemeClr val="bg1"/>
+                </a:solidFill>
                 <a:latin typeface="Envy Code R" panose="02000509000000020004" pitchFamily="49" charset="0"/>
-                <a:cs typeface="Consolas" panose="020B0609020204030204" pitchFamily="49" charset="0"/>
               </a:rPr>
               <a:t>of file</a:t>
             </a:r>
-            <a:endParaRPr lang="en-GB" sz="1200" dirty="0">
+            <a:endParaRPr lang="en-GB" sz="1400" dirty="0">
+              <a:solidFill>
+                <a:schemeClr val="bg1"/>
+              </a:solidFill>
               <a:latin typeface="Envy Code R" panose="02000509000000020004" pitchFamily="49" charset="0"/>
-              <a:cs typeface="Consolas" panose="020B0609020204030204" pitchFamily="49" charset="0"/>
             </a:endParaRPr>
           </a:p>
           <a:p>
-            <a:pPr>
-              <a:spcBef>
-                <a:spcPts val="300"/>
-              </a:spcBef>
-              <a:spcAft>
-                <a:spcPts val="300"/>
-              </a:spcAft>
-            </a:pPr>
-            <a:r>
-              <a:rPr lang="en-GB" sz="1200" dirty="0">
+            <a:r>
+              <a:rPr lang="en-GB" sz="1400" dirty="0">
+                <a:solidFill>
+                  <a:schemeClr val="bg1"/>
+                </a:solidFill>
                 <a:latin typeface="Envy Code R" panose="02000509000000020004" pitchFamily="49" charset="0"/>
-                <a:cs typeface="Consolas" panose="020B0609020204030204" pitchFamily="49" charset="0"/>
               </a:rPr>
               <a:t>after implementing a new feature.</a:t>
             </a:r>
           </a:p>
           <a:p>
-            <a:pPr>
-              <a:spcBef>
-                <a:spcPts val="300"/>
-              </a:spcBef>
-              <a:spcAft>
-                <a:spcPts val="300"/>
-              </a:spcAft>
-            </a:pPr>
-            <a:r>
-              <a:rPr lang="en-GB" sz="1200" dirty="0">
+            <a:r>
+              <a:rPr lang="en-GB" sz="1400" dirty="0">
+                <a:solidFill>
+                  <a:schemeClr val="accent6">
+                    <a:lumMod val="75000"/>
+                  </a:schemeClr>
+                </a:solidFill>
                 <a:latin typeface="Envy Code R" panose="02000509000000020004" pitchFamily="49" charset="0"/>
-                <a:cs typeface="Consolas" panose="020B0609020204030204" pitchFamily="49" charset="0"/>
               </a:rPr>
               <a:t>&gt;&gt;&gt;&gt;&gt;&gt;&gt; feature</a:t>
             </a:r>
@@ -5503,17 +5381,14 @@
         </p:nvSpPr>
         <p:spPr>
           <a:xfrm>
-            <a:off x="395536" y="4108143"/>
-            <a:ext cx="4068000" cy="1061829"/>
+            <a:off x="431536" y="3969064"/>
+            <a:ext cx="3996000" cy="954107"/>
           </a:xfrm>
           <a:prstGeom prst="rect">
             <a:avLst/>
           </a:prstGeom>
           <a:solidFill>
-            <a:schemeClr val="tx2">
-              <a:lumMod val="20000"/>
-              <a:lumOff val="80000"/>
-            </a:schemeClr>
+            <a:schemeClr val="tx1"/>
           </a:solidFill>
         </p:spPr>
         <p:txBody>
@@ -5522,91 +5397,69 @@
           </a:bodyPr>
           <a:lstStyle/>
           <a:p>
-            <a:pPr>
-              <a:spcBef>
-                <a:spcPts val="300"/>
-              </a:spcBef>
-              <a:spcAft>
-                <a:spcPts val="300"/>
-              </a:spcAft>
-            </a:pPr>
-            <a:r>
-              <a:rPr lang="en-GB" sz="1200" dirty="0">
+            <a:r>
+              <a:rPr lang="en-GB" sz="1400" dirty="0">
+                <a:solidFill>
+                  <a:schemeClr val="bg1"/>
+                </a:solidFill>
                 <a:latin typeface="Envy Code R" panose="02000509000000020004" pitchFamily="49" charset="0"/>
-                <a:cs typeface="Consolas" panose="020B0609020204030204" pitchFamily="49" charset="0"/>
               </a:rPr>
               <a:t>This is</a:t>
             </a:r>
           </a:p>
           <a:p>
-            <a:pPr>
-              <a:spcBef>
-                <a:spcPts val="300"/>
-              </a:spcBef>
-              <a:spcAft>
-                <a:spcPts val="300"/>
-              </a:spcAft>
-            </a:pPr>
-            <a:r>
-              <a:rPr lang="en-GB" sz="1200" dirty="0" smtClean="0">
+            <a:r>
+              <a:rPr lang="en-GB" sz="1400" dirty="0">
+                <a:solidFill>
+                  <a:schemeClr val="bg1"/>
+                </a:solidFill>
                 <a:latin typeface="Envy Code R" panose="02000509000000020004" pitchFamily="49" charset="0"/>
-                <a:cs typeface="Consolas" panose="020B0609020204030204" pitchFamily="49" charset="0"/>
               </a:rPr>
               <a:t>the</a:t>
             </a:r>
-            <a:endParaRPr lang="en-GB" sz="1200" dirty="0">
+            <a:endParaRPr lang="en-GB" sz="1400" dirty="0">
+              <a:solidFill>
+                <a:schemeClr val="bg1"/>
+              </a:solidFill>
               <a:latin typeface="Envy Code R" panose="02000509000000020004" pitchFamily="49" charset="0"/>
-              <a:cs typeface="Consolas" panose="020B0609020204030204" pitchFamily="49" charset="0"/>
             </a:endParaRPr>
           </a:p>
           <a:p>
-            <a:pPr>
-              <a:spcBef>
-                <a:spcPts val="300"/>
-              </a:spcBef>
-              <a:spcAft>
-                <a:spcPts val="300"/>
-              </a:spcAft>
-            </a:pPr>
-            <a:r>
-              <a:rPr lang="en-GB" sz="1200" dirty="0">
+            <a:r>
+              <a:rPr lang="en-GB" sz="1400" dirty="0">
+                <a:solidFill>
+                  <a:schemeClr val="bg1"/>
+                </a:solidFill>
                 <a:latin typeface="Envy Code R" panose="02000509000000020004" pitchFamily="49" charset="0"/>
-                <a:cs typeface="Consolas" panose="020B0609020204030204" pitchFamily="49" charset="0"/>
               </a:rPr>
               <a:t>content of </a:t>
             </a:r>
             <a:r>
-              <a:rPr lang="en-GB" sz="1200" dirty="0" smtClean="0">
+              <a:rPr lang="en-GB" sz="1400" dirty="0">
+                <a:solidFill>
+                  <a:schemeClr val="bg1"/>
+                </a:solidFill>
                 <a:latin typeface="Envy Code R" panose="02000509000000020004" pitchFamily="49" charset="0"/>
-                <a:cs typeface="Consolas" panose="020B0609020204030204" pitchFamily="49" charset="0"/>
               </a:rPr>
               <a:t>file</a:t>
             </a:r>
-            <a:endParaRPr lang="en-GB" sz="1200" dirty="0">
+            <a:endParaRPr lang="en-GB" sz="1400" dirty="0">
+              <a:solidFill>
+                <a:schemeClr val="bg1"/>
+              </a:solidFill>
               <a:latin typeface="Envy Code R" panose="02000509000000020004" pitchFamily="49" charset="0"/>
-              <a:cs typeface="Consolas" panose="020B0609020204030204" pitchFamily="49" charset="0"/>
             </a:endParaRPr>
           </a:p>
           <a:p>
-            <a:pPr>
-              <a:spcBef>
-                <a:spcPts val="300"/>
-              </a:spcBef>
-              <a:spcAft>
-                <a:spcPts val="300"/>
-              </a:spcAft>
-            </a:pPr>
-            <a:r>
-              <a:rPr lang="en-GB" sz="1200" dirty="0">
+            <a:r>
+              <a:rPr lang="en-GB" sz="1400" dirty="0">
+                <a:solidFill>
+                  <a:schemeClr val="bg1"/>
+                </a:solidFill>
                 <a:latin typeface="Envy Code R" panose="02000509000000020004" pitchFamily="49" charset="0"/>
-                <a:cs typeface="Consolas" panose="020B0609020204030204" pitchFamily="49" charset="0"/>
               </a:rPr>
               <a:t>after implementing a new feature.</a:t>
             </a:r>
-            <a:endParaRPr lang="en-GB" sz="1200" dirty="0">
-              <a:latin typeface="Envy Code R" panose="02000509000000020004" pitchFamily="49" charset="0"/>
-              <a:cs typeface="Consolas" panose="020B0609020204030204" pitchFamily="49" charset="0"/>
-            </a:endParaRPr>
           </a:p>
         </p:txBody>
       </p:sp>
@@ -5618,7 +5471,7 @@
         </p:nvSpPr>
         <p:spPr>
           <a:xfrm>
-            <a:off x="395536" y="1863836"/>
+            <a:off x="395536" y="2060848"/>
             <a:ext cx="4068000" cy="400110"/>
           </a:xfrm>
           <a:prstGeom prst="rect">
@@ -5633,24 +5486,10 @@
           <a:p>
             <a:pPr algn="ctr"/>
             <a:r>
-              <a:rPr lang="en-GB" sz="2000" b="1" dirty="0" smtClean="0">
-                <a:solidFill>
-                  <a:schemeClr val="accent6">
-                    <a:lumMod val="50000"/>
-                  </a:schemeClr>
-                </a:solidFill>
-                <a:latin typeface="Envy Code R" panose="02000509000000020004" pitchFamily="49" charset="0"/>
-              </a:rPr>
+              <a:rPr lang="en-GB" sz="2000" dirty="0" smtClean="0"/>
               <a:t>branch master HEAD</a:t>
             </a:r>
-            <a:endParaRPr lang="en-GB" sz="2000" b="1" dirty="0">
-              <a:solidFill>
-                <a:schemeClr val="accent6">
-                  <a:lumMod val="50000"/>
-                </a:schemeClr>
-              </a:solidFill>
-              <a:latin typeface="Envy Code R" panose="02000509000000020004" pitchFamily="49" charset="0"/>
-            </a:endParaRPr>
+            <a:endParaRPr lang="en-GB" sz="2000" dirty="0"/>
           </a:p>
         </p:txBody>
       </p:sp>
@@ -5662,7 +5501,7 @@
         </p:nvSpPr>
         <p:spPr>
           <a:xfrm>
-            <a:off x="4716016" y="1863836"/>
+            <a:off x="4716016" y="2060848"/>
             <a:ext cx="3866400" cy="400110"/>
           </a:xfrm>
           <a:prstGeom prst="rect">
@@ -5677,24 +5516,10 @@
           <a:p>
             <a:pPr algn="ctr"/>
             <a:r>
-              <a:rPr lang="en-GB" sz="2000" b="1" dirty="0" smtClean="0">
-                <a:solidFill>
-                  <a:schemeClr val="accent6">
-                    <a:lumMod val="50000"/>
-                  </a:schemeClr>
-                </a:solidFill>
-                <a:latin typeface="Envy Code R" panose="02000509000000020004" pitchFamily="49" charset="0"/>
-              </a:rPr>
+              <a:rPr lang="en-GB" sz="2000" dirty="0" smtClean="0"/>
               <a:t>unmerged state</a:t>
             </a:r>
-            <a:endParaRPr lang="en-GB" sz="2000" b="1" dirty="0">
-              <a:solidFill>
-                <a:schemeClr val="accent6">
-                  <a:lumMod val="50000"/>
-                </a:schemeClr>
-              </a:solidFill>
-              <a:latin typeface="Envy Code R" panose="02000509000000020004" pitchFamily="49" charset="0"/>
-            </a:endParaRPr>
+            <a:endParaRPr lang="en-GB" sz="2000" dirty="0"/>
           </a:p>
         </p:txBody>
       </p:sp>
@@ -5706,7 +5531,7 @@
         </p:nvSpPr>
         <p:spPr>
           <a:xfrm>
-            <a:off x="395536" y="3698330"/>
+            <a:off x="395536" y="3585942"/>
             <a:ext cx="4068000" cy="400110"/>
           </a:xfrm>
           <a:prstGeom prst="rect">
@@ -5721,24 +5546,10 @@
           <a:p>
             <a:pPr algn="ctr"/>
             <a:r>
-              <a:rPr lang="en-GB" sz="2000" b="1" dirty="0" smtClean="0">
-                <a:solidFill>
-                  <a:schemeClr val="accent6">
-                    <a:lumMod val="50000"/>
-                  </a:schemeClr>
-                </a:solidFill>
-                <a:latin typeface="Envy Code R" panose="02000509000000020004" pitchFamily="49" charset="0"/>
-              </a:rPr>
+              <a:rPr lang="en-GB" sz="2000" dirty="0" smtClean="0"/>
               <a:t>branch feature</a:t>
             </a:r>
-            <a:endParaRPr lang="en-GB" sz="2000" b="1" dirty="0">
-              <a:solidFill>
-                <a:schemeClr val="accent6">
-                  <a:lumMod val="50000"/>
-                </a:schemeClr>
-              </a:solidFill>
-              <a:latin typeface="Envy Code R" panose="02000509000000020004" pitchFamily="49" charset="0"/>
-            </a:endParaRPr>
+            <a:endParaRPr lang="en-GB" sz="2000" dirty="0"/>
           </a:p>
         </p:txBody>
       </p:sp>

</xml_diff>

<commit_message>
minor update, changes several headings
</commit_message>
<xml_diff>
--- a/slides/branching_merging.pptx
+++ b/slides/branching_merging.pptx
@@ -298,7 +298,7 @@
           <a:p>
             <a:fld id="{90F9FD6A-4F12-448B-953A-1522474C3AC3}" type="datetimeFigureOut">
               <a:rPr lang="en-GB" smtClean="0"/>
-              <a:t>28/09/2013</a:t>
+              <a:t>29/09/2013</a:t>
             </a:fld>
             <a:endParaRPr lang="en-GB"/>
           </a:p>
@@ -468,7 +468,7 @@
           <a:p>
             <a:fld id="{90F9FD6A-4F12-448B-953A-1522474C3AC3}" type="datetimeFigureOut">
               <a:rPr lang="en-GB" smtClean="0"/>
-              <a:t>28/09/2013</a:t>
+              <a:t>29/09/2013</a:t>
             </a:fld>
             <a:endParaRPr lang="en-GB"/>
           </a:p>
@@ -648,7 +648,7 @@
           <a:p>
             <a:fld id="{90F9FD6A-4F12-448B-953A-1522474C3AC3}" type="datetimeFigureOut">
               <a:rPr lang="en-GB" smtClean="0"/>
-              <a:t>28/09/2013</a:t>
+              <a:t>29/09/2013</a:t>
             </a:fld>
             <a:endParaRPr lang="en-GB"/>
           </a:p>
@@ -818,7 +818,7 @@
           <a:p>
             <a:fld id="{90F9FD6A-4F12-448B-953A-1522474C3AC3}" type="datetimeFigureOut">
               <a:rPr lang="en-GB" smtClean="0"/>
-              <a:t>28/09/2013</a:t>
+              <a:t>29/09/2013</a:t>
             </a:fld>
             <a:endParaRPr lang="en-GB"/>
           </a:p>
@@ -1064,7 +1064,7 @@
           <a:p>
             <a:fld id="{90F9FD6A-4F12-448B-953A-1522474C3AC3}" type="datetimeFigureOut">
               <a:rPr lang="en-GB" smtClean="0"/>
-              <a:t>28/09/2013</a:t>
+              <a:t>29/09/2013</a:t>
             </a:fld>
             <a:endParaRPr lang="en-GB"/>
           </a:p>
@@ -1352,7 +1352,7 @@
           <a:p>
             <a:fld id="{90F9FD6A-4F12-448B-953A-1522474C3AC3}" type="datetimeFigureOut">
               <a:rPr lang="en-GB" smtClean="0"/>
-              <a:t>28/09/2013</a:t>
+              <a:t>29/09/2013</a:t>
             </a:fld>
             <a:endParaRPr lang="en-GB"/>
           </a:p>
@@ -1774,7 +1774,7 @@
           <a:p>
             <a:fld id="{90F9FD6A-4F12-448B-953A-1522474C3AC3}" type="datetimeFigureOut">
               <a:rPr lang="en-GB" smtClean="0"/>
-              <a:t>28/09/2013</a:t>
+              <a:t>29/09/2013</a:t>
             </a:fld>
             <a:endParaRPr lang="en-GB"/>
           </a:p>
@@ -1892,7 +1892,7 @@
           <a:p>
             <a:fld id="{90F9FD6A-4F12-448B-953A-1522474C3AC3}" type="datetimeFigureOut">
               <a:rPr lang="en-GB" smtClean="0"/>
-              <a:t>28/09/2013</a:t>
+              <a:t>29/09/2013</a:t>
             </a:fld>
             <a:endParaRPr lang="en-GB"/>
           </a:p>
@@ -1987,7 +1987,7 @@
           <a:p>
             <a:fld id="{90F9FD6A-4F12-448B-953A-1522474C3AC3}" type="datetimeFigureOut">
               <a:rPr lang="en-GB" smtClean="0"/>
-              <a:t>28/09/2013</a:t>
+              <a:t>29/09/2013</a:t>
             </a:fld>
             <a:endParaRPr lang="en-GB"/>
           </a:p>
@@ -2264,7 +2264,7 @@
           <a:p>
             <a:fld id="{90F9FD6A-4F12-448B-953A-1522474C3AC3}" type="datetimeFigureOut">
               <a:rPr lang="en-GB" smtClean="0"/>
-              <a:t>28/09/2013</a:t>
+              <a:t>29/09/2013</a:t>
             </a:fld>
             <a:endParaRPr lang="en-GB"/>
           </a:p>
@@ -2517,7 +2517,7 @@
           <a:p>
             <a:fld id="{90F9FD6A-4F12-448B-953A-1522474C3AC3}" type="datetimeFigureOut">
               <a:rPr lang="en-GB" smtClean="0"/>
-              <a:t>28/09/2013</a:t>
+              <a:t>29/09/2013</a:t>
             </a:fld>
             <a:endParaRPr lang="en-GB"/>
           </a:p>
@@ -2730,7 +2730,7 @@
           <a:p>
             <a:fld id="{90F9FD6A-4F12-448B-953A-1522474C3AC3}" type="datetimeFigureOut">
               <a:rPr lang="en-GB" smtClean="0"/>
-              <a:t>28/09/2013</a:t>
+              <a:t>29/09/2013</a:t>
             </a:fld>
             <a:endParaRPr lang="en-GB"/>
           </a:p>
@@ -3213,15 +3213,6 @@
         <p:blipFill>
           <a:blip r:embed="rId2">
             <a:extLst>
-              <a:ext uri="{BEBA8EAE-BF5A-486C-A8C5-ECC9F3942E4B}">
-                <a14:imgProps xmlns:a14="http://schemas.microsoft.com/office/drawing/2010/main">
-                  <a14:imgLayer r:embed="rId3">
-                    <a14:imgEffect>
-                      <a14:sharpenSoften amount="25000"/>
-                    </a14:imgEffect>
-                  </a14:imgLayer>
-                </a14:imgProps>
-              </a:ext>
               <a:ext uri="{28A0092B-C50C-407E-A947-70E740481C1C}">
                 <a14:useLocalDpi xmlns:a14="http://schemas.microsoft.com/office/drawing/2010/main" val="0"/>
               </a:ext>
@@ -3233,8 +3224,8 @@
         </p:blipFill>
         <p:spPr>
           <a:xfrm>
-            <a:off x="719572" y="1412776"/>
-            <a:ext cx="7704857" cy="5163160"/>
+            <a:off x="719572" y="1254358"/>
+            <a:ext cx="7704857" cy="4334882"/>
           </a:xfrm>
           <a:prstGeom prst="rect">
             <a:avLst/>
@@ -3247,6 +3238,36 @@
           </a:effectLst>
         </p:spPr>
       </p:pic>
+      <p:sp>
+        <p:nvSpPr>
+          <p:cNvPr id="5" name="Rectangle 4"/>
+          <p:cNvSpPr/>
+          <p:nvPr/>
+        </p:nvSpPr>
+        <p:spPr>
+          <a:xfrm>
+            <a:off x="467544" y="5518800"/>
+            <a:ext cx="8280920" cy="954107"/>
+          </a:xfrm>
+          <a:prstGeom prst="rect">
+            <a:avLst/>
+          </a:prstGeom>
+        </p:spPr>
+        <p:txBody>
+          <a:bodyPr wrap="square">
+            <a:spAutoFit/>
+          </a:bodyPr>
+          <a:lstStyle/>
+          <a:p>
+            <a:pPr algn="ctr"/>
+            <a:r>
+              <a:rPr lang="en-GB" sz="2800" dirty="0" smtClean="0"/>
+              <a:t>Various merge tools exist that compare and merge multiple files, and provide graphic views of the conflicts.</a:t>
+            </a:r>
+            <a:endParaRPr lang="en-GB" sz="2800" dirty="0" smtClean="0"/>
+          </a:p>
+        </p:txBody>
+      </p:sp>
     </p:spTree>
     <p:extLst>
       <p:ext uri="{BB962C8B-B14F-4D97-AF65-F5344CB8AC3E}">
@@ -4858,7 +4879,11 @@
           <a:p>
             <a:r>
               <a:rPr lang="en-GB" dirty="0" smtClean="0"/>
-              <a:t>3-Way Merge (2)</a:t>
+              <a:t>3-Way Merge </a:t>
+            </a:r>
+            <a:r>
+              <a:rPr lang="en-GB" dirty="0" smtClean="0"/>
+              <a:t>(3)</a:t>
             </a:r>
             <a:endParaRPr lang="en-GB" dirty="0"/>
           </a:p>
@@ -5475,7 +5500,23 @@
             </a:br>
             <a:r>
               <a:rPr lang="en-GB" sz="2800" dirty="0" smtClean="0"/>
-              <a:t>to mark resolved, and use </a:t>
+              <a:t>to mark </a:t>
+            </a:r>
+            <a:r>
+              <a:rPr lang="en-GB" sz="2800" dirty="0" smtClean="0"/>
+              <a:t>it resolved</a:t>
+            </a:r>
+            <a:r>
+              <a:rPr lang="en-GB" sz="2800" dirty="0" smtClean="0"/>
+              <a:t>, </a:t>
+            </a:r>
+            <a:r>
+              <a:rPr lang="en-GB" sz="2800" dirty="0" smtClean="0"/>
+              <a:t>then </a:t>
+            </a:r>
+            <a:r>
+              <a:rPr lang="en-GB" sz="2800" dirty="0" smtClean="0"/>
+              <a:t>use </a:t>
             </a:r>
             <a:r>
               <a:rPr lang="en-GB" sz="2800" dirty="0" smtClean="0">

</xml_diff>